<commit_message>
Add cycle summary slide
</commit_message>
<xml_diff>
--- a/tutorial2/presentation.pptx
+++ b/tutorial2/presentation.pptx
@@ -5,10 +5,10 @@
     <p:sldMasterId id="2147483648" r:id="rId1"/>
   </p:sldMasterIdLst>
   <p:notesMasterIdLst>
-    <p:notesMasterId r:id="rId45"/>
+    <p:notesMasterId r:id="rId46"/>
   </p:notesMasterIdLst>
   <p:handoutMasterIdLst>
-    <p:handoutMasterId r:id="rId46"/>
+    <p:handoutMasterId r:id="rId47"/>
   </p:handoutMasterIdLst>
   <p:sldIdLst>
     <p:sldId id="256" r:id="rId2"/>
@@ -54,6 +54,7 @@
     <p:sldId id="326" r:id="rId42"/>
     <p:sldId id="327" r:id="rId43"/>
     <p:sldId id="328" r:id="rId44"/>
+    <p:sldId id="329" r:id="rId45"/>
   </p:sldIdLst>
   <p:sldSz cx="9144000" cy="6858000" type="screen4x3"/>
   <p:notesSz cx="6858000" cy="9144000"/>
@@ -237,7 +238,7 @@
           <a:p>
             <a:fld id="{AD2AC528-4D53-894B-B349-B5F710F9F56E}" type="datetimeFigureOut">
               <a:rPr lang="en-US" smtClean="0"/>
-              <a:t>4/15/16</a:t>
+              <a:t>4/25/16</a:t>
             </a:fld>
             <a:endParaRPr lang="en-US"/>
           </a:p>
@@ -403,7 +404,7 @@
           <a:p>
             <a:fld id="{04248DE7-56DE-4545-BF35-D3E870520EC4}" type="datetimeFigureOut">
               <a:rPr lang="en-US" smtClean="0"/>
-              <a:t>4/15/16</a:t>
+              <a:t>4/25/16</a:t>
             </a:fld>
             <a:endParaRPr lang="en-US"/>
           </a:p>
@@ -853,7 +854,7 @@
           <a:p>
             <a:fld id="{F0CFD93C-F7B8-7A45-B65F-B46001A15069}" type="datetime1">
               <a:rPr lang="en-US" smtClean="0"/>
-              <a:t>4/15/16</a:t>
+              <a:t>4/25/16</a:t>
             </a:fld>
             <a:endParaRPr lang="en-US"/>
           </a:p>
@@ -1023,7 +1024,7 @@
           <a:p>
             <a:fld id="{3A1E3DB1-C5A5-174F-BE4E-2B29128F6B65}" type="datetime1">
               <a:rPr lang="en-US" smtClean="0"/>
-              <a:t>4/15/16</a:t>
+              <a:t>4/25/16</a:t>
             </a:fld>
             <a:endParaRPr lang="en-US"/>
           </a:p>
@@ -1203,7 +1204,7 @@
           <a:p>
             <a:fld id="{1FEAB65C-BC1D-B449-814D-C7F123D90314}" type="datetime1">
               <a:rPr lang="en-US" smtClean="0"/>
-              <a:t>4/15/16</a:t>
+              <a:t>4/25/16</a:t>
             </a:fld>
             <a:endParaRPr lang="en-US"/>
           </a:p>
@@ -1373,7 +1374,7 @@
           <a:p>
             <a:fld id="{DAF1656F-77EA-0F4E-B647-FAE93B18614F}" type="datetime1">
               <a:rPr lang="en-US" smtClean="0"/>
-              <a:t>4/15/16</a:t>
+              <a:t>4/25/16</a:t>
             </a:fld>
             <a:endParaRPr lang="en-US"/>
           </a:p>
@@ -1619,7 +1620,7 @@
           <a:p>
             <a:fld id="{5C7EA5FB-D35F-C84C-A07A-E097C9426CB1}" type="datetime1">
               <a:rPr lang="en-US" smtClean="0"/>
-              <a:t>4/15/16</a:t>
+              <a:t>4/25/16</a:t>
             </a:fld>
             <a:endParaRPr lang="en-US"/>
           </a:p>
@@ -1907,7 +1908,7 @@
           <a:p>
             <a:fld id="{7DBB6A11-E179-1941-8976-7258DA8D5258}" type="datetime1">
               <a:rPr lang="en-US" smtClean="0"/>
-              <a:t>4/15/16</a:t>
+              <a:t>4/25/16</a:t>
             </a:fld>
             <a:endParaRPr lang="en-US"/>
           </a:p>
@@ -2329,7 +2330,7 @@
           <a:p>
             <a:fld id="{B0A5A22F-FC3E-1B4F-ACA2-CB3FFF8D6940}" type="datetime1">
               <a:rPr lang="en-US" smtClean="0"/>
-              <a:t>4/15/16</a:t>
+              <a:t>4/25/16</a:t>
             </a:fld>
             <a:endParaRPr lang="en-US"/>
           </a:p>
@@ -2447,7 +2448,7 @@
           <a:p>
             <a:fld id="{26B8F881-6909-BC42-B354-9110D63E42E8}" type="datetime1">
               <a:rPr lang="en-US" smtClean="0"/>
-              <a:t>4/15/16</a:t>
+              <a:t>4/25/16</a:t>
             </a:fld>
             <a:endParaRPr lang="en-US"/>
           </a:p>
@@ -2542,7 +2543,7 @@
           <a:p>
             <a:fld id="{DA3B4506-48D2-0B44-A17E-5DFFB56FD14A}" type="datetime1">
               <a:rPr lang="en-US" smtClean="0"/>
-              <a:t>4/15/16</a:t>
+              <a:t>4/25/16</a:t>
             </a:fld>
             <a:endParaRPr lang="en-US"/>
           </a:p>
@@ -2819,7 +2820,7 @@
           <a:p>
             <a:fld id="{CF15AE37-79C8-194C-AD2E-0574BE677E98}" type="datetime1">
               <a:rPr lang="en-US" smtClean="0"/>
-              <a:t>4/15/16</a:t>
+              <a:t>4/25/16</a:t>
             </a:fld>
             <a:endParaRPr lang="en-US"/>
           </a:p>
@@ -3072,7 +3073,7 @@
           <a:p>
             <a:fld id="{8BEADC64-64FD-F04B-A7C6-AED090FA800D}" type="datetime1">
               <a:rPr lang="en-US" smtClean="0"/>
-              <a:t>4/15/16</a:t>
+              <a:t>4/25/16</a:t>
             </a:fld>
             <a:endParaRPr lang="en-US"/>
           </a:p>
@@ -3285,7 +3286,7 @@
           <a:p>
             <a:fld id="{9730384F-D402-E146-B026-C2C110B656BD}" type="datetime1">
               <a:rPr lang="en-US" smtClean="0"/>
-              <a:t>4/15/16</a:t>
+              <a:t>4/25/16</a:t>
             </a:fld>
             <a:endParaRPr lang="en-US"/>
           </a:p>
@@ -3678,7 +3679,7 @@
           <a:p>
             <a:r>
               <a:rPr lang="en-US" dirty="0" smtClean="0"/>
-              <a:t>Workflow</a:t>
+              <a:t>A Single Contributor Workflow</a:t>
             </a:r>
             <a:endParaRPr lang="en-US" dirty="0"/>
           </a:p>
@@ -3699,7 +3700,30 @@
           <a:bodyPr/>
           <a:lstStyle/>
           <a:p>
-            <a:endParaRPr lang="en-US"/>
+            <a:r>
+              <a:rPr lang="en-US" dirty="0" err="1" smtClean="0"/>
+              <a:t>Darci</a:t>
+            </a:r>
+            <a:r>
+              <a:rPr lang="en-US" dirty="0" smtClean="0"/>
+              <a:t> </a:t>
+            </a:r>
+            <a:r>
+              <a:rPr lang="en-US" dirty="0" err="1" smtClean="0"/>
+              <a:t>Burdge</a:t>
+            </a:r>
+            <a:r>
+              <a:rPr lang="en-US" dirty="0" smtClean="0"/>
+              <a:t/>
+            </a:r>
+            <a:br>
+              <a:rPr lang="en-US" dirty="0" smtClean="0"/>
+            </a:br>
+            <a:r>
+              <a:rPr lang="en-US" dirty="0" smtClean="0"/>
+              <a:t>Stoney Jackson</a:t>
+            </a:r>
+            <a:endParaRPr lang="en-US" dirty="0"/>
           </a:p>
         </p:txBody>
       </p:sp>
@@ -31951,6 +31975,1150 @@
 </p:sld>
 </file>
 
+<file path=ppt/slides/slide44.xml><?xml version="1.0" encoding="utf-8"?>
+<p:sld xmlns:a="http://schemas.openxmlformats.org/drawingml/2006/main" xmlns:r="http://schemas.openxmlformats.org/officeDocument/2006/relationships" xmlns:p="http://schemas.openxmlformats.org/presentationml/2006/main">
+  <p:cSld>
+    <p:spTree>
+      <p:nvGrpSpPr>
+        <p:cNvPr id="1" name=""/>
+        <p:cNvGrpSpPr/>
+        <p:nvPr/>
+      </p:nvGrpSpPr>
+      <p:grpSpPr>
+        <a:xfrm>
+          <a:off x="0" y="0"/>
+          <a:ext cx="0" cy="0"/>
+          <a:chOff x="0" y="0"/>
+          <a:chExt cx="0" cy="0"/>
+        </a:xfrm>
+      </p:grpSpPr>
+      <p:sp>
+        <p:nvSpPr>
+          <p:cNvPr id="3" name="Slide Number Placeholder 2"/>
+          <p:cNvSpPr>
+            <a:spLocks noGrp="1"/>
+          </p:cNvSpPr>
+          <p:nvPr>
+            <p:ph type="sldNum" sz="quarter" idx="12"/>
+          </p:nvPr>
+        </p:nvSpPr>
+        <p:spPr/>
+        <p:txBody>
+          <a:bodyPr/>
+          <a:lstStyle/>
+          <a:p>
+            <a:fld id="{359744D5-AA56-484C-8B57-85B289DA1210}" type="slidenum">
+              <a:rPr lang="en-US" smtClean="0"/>
+              <a:t>44</a:t>
+            </a:fld>
+            <a:endParaRPr lang="en-US"/>
+          </a:p>
+        </p:txBody>
+      </p:sp>
+      <p:grpSp>
+        <p:nvGrpSpPr>
+          <p:cNvPr id="12" name="Group 11"/>
+          <p:cNvGrpSpPr/>
+          <p:nvPr/>
+        </p:nvGrpSpPr>
+        <p:grpSpPr>
+          <a:xfrm>
+            <a:off x="3914196" y="2226998"/>
+            <a:ext cx="6071292" cy="4598847"/>
+            <a:chOff x="768614" y="1417638"/>
+            <a:chExt cx="7918186" cy="4951458"/>
+          </a:xfrm>
+        </p:grpSpPr>
+        <p:sp>
+          <p:nvSpPr>
+            <p:cNvPr id="4" name="Cloud 3"/>
+            <p:cNvSpPr/>
+            <p:nvPr/>
+          </p:nvSpPr>
+          <p:spPr>
+            <a:xfrm>
+              <a:off x="768614" y="1771424"/>
+              <a:ext cx="7918186" cy="2139077"/>
+            </a:xfrm>
+            <a:prstGeom prst="cloud">
+              <a:avLst/>
+            </a:prstGeom>
+          </p:spPr>
+          <p:style>
+            <a:lnRef idx="1">
+              <a:schemeClr val="accent1"/>
+            </a:lnRef>
+            <a:fillRef idx="2">
+              <a:schemeClr val="accent1"/>
+            </a:fillRef>
+            <a:effectRef idx="1">
+              <a:schemeClr val="accent1"/>
+            </a:effectRef>
+            <a:fontRef idx="minor">
+              <a:schemeClr val="dk1"/>
+            </a:fontRef>
+          </p:style>
+          <p:txBody>
+            <a:bodyPr rtlCol="0" anchor="ctr"/>
+            <a:lstStyle/>
+            <a:p>
+              <a:pPr algn="ctr"/>
+              <a:endParaRPr lang="en-US" sz="4800" dirty="0"/>
+            </a:p>
+          </p:txBody>
+        </p:sp>
+        <p:sp>
+          <p:nvSpPr>
+            <p:cNvPr id="6" name="Can 5"/>
+            <p:cNvSpPr/>
+            <p:nvPr/>
+          </p:nvSpPr>
+          <p:spPr>
+            <a:xfrm>
+              <a:off x="5580807" y="1487321"/>
+              <a:ext cx="1871408" cy="1604308"/>
+            </a:xfrm>
+            <a:prstGeom prst="can">
+              <a:avLst/>
+            </a:prstGeom>
+          </p:spPr>
+          <p:style>
+            <a:lnRef idx="2">
+              <a:schemeClr val="accent1">
+                <a:shade val="50000"/>
+              </a:schemeClr>
+            </a:lnRef>
+            <a:fillRef idx="1">
+              <a:schemeClr val="accent1"/>
+            </a:fillRef>
+            <a:effectRef idx="0">
+              <a:schemeClr val="accent1"/>
+            </a:effectRef>
+            <a:fontRef idx="minor">
+              <a:schemeClr val="lt1"/>
+            </a:fontRef>
+          </p:style>
+          <p:txBody>
+            <a:bodyPr rtlCol="0" anchor="ctr"/>
+            <a:lstStyle/>
+            <a:p>
+              <a:pPr algn="ctr"/>
+              <a:r>
+                <a:rPr lang="en-US" sz="2000" dirty="0"/>
+                <a:t>upstream</a:t>
+              </a:r>
+              <a:br>
+                <a:rPr lang="en-US" sz="2000" dirty="0"/>
+              </a:br>
+              <a:r>
+                <a:rPr lang="en-US" sz="2000" dirty="0"/>
+                <a:t>(theirs)</a:t>
+              </a:r>
+            </a:p>
+          </p:txBody>
+        </p:sp>
+        <p:sp>
+          <p:nvSpPr>
+            <p:cNvPr id="7" name="Can 6"/>
+            <p:cNvSpPr/>
+            <p:nvPr/>
+          </p:nvSpPr>
+          <p:spPr>
+            <a:xfrm>
+              <a:off x="2057227" y="1487321"/>
+              <a:ext cx="1871408" cy="1604308"/>
+            </a:xfrm>
+            <a:prstGeom prst="can">
+              <a:avLst/>
+            </a:prstGeom>
+          </p:spPr>
+          <p:style>
+            <a:lnRef idx="2">
+              <a:schemeClr val="accent1">
+                <a:shade val="50000"/>
+              </a:schemeClr>
+            </a:lnRef>
+            <a:fillRef idx="1">
+              <a:schemeClr val="accent1"/>
+            </a:fillRef>
+            <a:effectRef idx="0">
+              <a:schemeClr val="accent1"/>
+            </a:effectRef>
+            <a:fontRef idx="minor">
+              <a:schemeClr val="lt1"/>
+            </a:fontRef>
+          </p:style>
+          <p:txBody>
+            <a:bodyPr rtlCol="0" anchor="ctr"/>
+            <a:lstStyle/>
+            <a:p>
+              <a:pPr algn="ctr"/>
+              <a:r>
+                <a:rPr lang="en-US" sz="2000" dirty="0"/>
+                <a:t>origin</a:t>
+              </a:r>
+              <a:br>
+                <a:rPr lang="en-US" sz="2000" dirty="0"/>
+              </a:br>
+              <a:r>
+                <a:rPr lang="en-US" sz="2000" dirty="0"/>
+                <a:t>(yours)</a:t>
+              </a:r>
+            </a:p>
+          </p:txBody>
+        </p:sp>
+        <p:sp>
+          <p:nvSpPr>
+            <p:cNvPr id="9" name="Can 8"/>
+            <p:cNvSpPr/>
+            <p:nvPr/>
+          </p:nvSpPr>
+          <p:spPr>
+            <a:xfrm>
+              <a:off x="2057227" y="4764788"/>
+              <a:ext cx="1871408" cy="1604308"/>
+            </a:xfrm>
+            <a:prstGeom prst="can">
+              <a:avLst/>
+            </a:prstGeom>
+          </p:spPr>
+          <p:style>
+            <a:lnRef idx="2">
+              <a:schemeClr val="accent1">
+                <a:shade val="50000"/>
+              </a:schemeClr>
+            </a:lnRef>
+            <a:fillRef idx="1">
+              <a:schemeClr val="accent1"/>
+            </a:fillRef>
+            <a:effectRef idx="0">
+              <a:schemeClr val="accent1"/>
+            </a:effectRef>
+            <a:fontRef idx="minor">
+              <a:schemeClr val="lt1"/>
+            </a:fontRef>
+          </p:style>
+          <p:txBody>
+            <a:bodyPr rtlCol="0" anchor="ctr"/>
+            <a:lstStyle/>
+            <a:p>
+              <a:pPr algn="ctr"/>
+              <a:r>
+                <a:rPr lang="en-US" sz="2000" dirty="0"/>
+                <a:t>local</a:t>
+              </a:r>
+              <a:br>
+                <a:rPr lang="en-US" sz="2000" dirty="0"/>
+              </a:br>
+              <a:r>
+                <a:rPr lang="en-US" sz="2000" dirty="0"/>
+                <a:t>(yours)</a:t>
+              </a:r>
+            </a:p>
+          </p:txBody>
+        </p:sp>
+        <p:cxnSp>
+          <p:nvCxnSpPr>
+            <p:cNvPr id="5" name="Straight Arrow Connector 4"/>
+            <p:cNvCxnSpPr>
+              <a:stCxn id="9" idx="1"/>
+              <a:endCxn id="7" idx="3"/>
+            </p:cNvCxnSpPr>
+            <p:nvPr/>
+          </p:nvCxnSpPr>
+          <p:spPr>
+            <a:xfrm flipV="1">
+              <a:off x="2992931" y="3091629"/>
+              <a:ext cx="0" cy="1673159"/>
+            </a:xfrm>
+            <a:prstGeom prst="straightConnector1">
+              <a:avLst/>
+            </a:prstGeom>
+            <a:ln>
+              <a:tailEnd type="arrow"/>
+            </a:ln>
+          </p:spPr>
+          <p:style>
+            <a:lnRef idx="2">
+              <a:schemeClr val="accent2"/>
+            </a:lnRef>
+            <a:fillRef idx="0">
+              <a:schemeClr val="accent2"/>
+            </a:fillRef>
+            <a:effectRef idx="1">
+              <a:schemeClr val="accent2"/>
+            </a:effectRef>
+            <a:fontRef idx="minor">
+              <a:schemeClr val="tx1"/>
+            </a:fontRef>
+          </p:style>
+        </p:cxnSp>
+        <p:cxnSp>
+          <p:nvCxnSpPr>
+            <p:cNvPr id="15" name="Straight Arrow Connector 14"/>
+            <p:cNvCxnSpPr>
+              <a:stCxn id="7" idx="4"/>
+              <a:endCxn id="6" idx="2"/>
+            </p:cNvCxnSpPr>
+            <p:nvPr/>
+          </p:nvCxnSpPr>
+          <p:spPr>
+            <a:xfrm>
+              <a:off x="3928635" y="2289475"/>
+              <a:ext cx="1652172" cy="0"/>
+            </a:xfrm>
+            <a:prstGeom prst="straightConnector1">
+              <a:avLst/>
+            </a:prstGeom>
+            <a:ln w="57150" cmpd="sng">
+              <a:tailEnd type="triangle" w="lg" len="lg"/>
+            </a:ln>
+          </p:spPr>
+          <p:style>
+            <a:lnRef idx="2">
+              <a:schemeClr val="accent1">
+                <a:shade val="50000"/>
+              </a:schemeClr>
+            </a:lnRef>
+            <a:fillRef idx="1">
+              <a:schemeClr val="accent1"/>
+            </a:fillRef>
+            <a:effectRef idx="0">
+              <a:schemeClr val="accent1"/>
+            </a:effectRef>
+            <a:fontRef idx="minor">
+              <a:schemeClr val="lt1"/>
+            </a:fontRef>
+          </p:style>
+        </p:cxnSp>
+        <p:sp>
+          <p:nvSpPr>
+            <p:cNvPr id="10" name="Up Arrow 9"/>
+            <p:cNvSpPr/>
+            <p:nvPr/>
+          </p:nvSpPr>
+          <p:spPr>
+            <a:xfrm>
+              <a:off x="2150279" y="3073921"/>
+              <a:ext cx="1778356" cy="1673159"/>
+            </a:xfrm>
+            <a:prstGeom prst="upArrow">
+              <a:avLst/>
+            </a:prstGeom>
+          </p:spPr>
+          <p:style>
+            <a:lnRef idx="1">
+              <a:schemeClr val="dk1"/>
+            </a:lnRef>
+            <a:fillRef idx="2">
+              <a:schemeClr val="dk1"/>
+            </a:fillRef>
+            <a:effectRef idx="1">
+              <a:schemeClr val="dk1"/>
+            </a:effectRef>
+            <a:fontRef idx="minor">
+              <a:schemeClr val="dk1"/>
+            </a:fontRef>
+          </p:style>
+          <p:txBody>
+            <a:bodyPr rtlCol="0" anchor="ctr"/>
+            <a:lstStyle/>
+            <a:p>
+              <a:pPr algn="ctr"/>
+              <a:r>
+                <a:rPr lang="en-US" sz="2000" dirty="0"/>
+                <a:t>push</a:t>
+              </a:r>
+            </a:p>
+          </p:txBody>
+        </p:sp>
+        <p:sp>
+          <p:nvSpPr>
+            <p:cNvPr id="13" name="Oval 12"/>
+            <p:cNvSpPr/>
+            <p:nvPr/>
+          </p:nvSpPr>
+          <p:spPr>
+            <a:xfrm>
+              <a:off x="3340915" y="4663059"/>
+              <a:ext cx="428196" cy="439694"/>
+            </a:xfrm>
+            <a:prstGeom prst="ellipse">
+              <a:avLst/>
+            </a:prstGeom>
+          </p:spPr>
+          <p:style>
+            <a:lnRef idx="1">
+              <a:schemeClr val="dk1"/>
+            </a:lnRef>
+            <a:fillRef idx="2">
+              <a:schemeClr val="dk1"/>
+            </a:fillRef>
+            <a:effectRef idx="1">
+              <a:schemeClr val="dk1"/>
+            </a:effectRef>
+            <a:fontRef idx="minor">
+              <a:schemeClr val="dk1"/>
+            </a:fontRef>
+          </p:style>
+          <p:txBody>
+            <a:bodyPr rtlCol="0" anchor="ctr"/>
+            <a:lstStyle/>
+            <a:p>
+              <a:pPr algn="ctr"/>
+              <a:endParaRPr lang="en-US" sz="1400"/>
+            </a:p>
+          </p:txBody>
+        </p:sp>
+        <p:sp>
+          <p:nvSpPr>
+            <p:cNvPr id="21" name="Oval 20"/>
+            <p:cNvSpPr/>
+            <p:nvPr/>
+          </p:nvSpPr>
+          <p:spPr>
+            <a:xfrm>
+              <a:off x="3340915" y="1417638"/>
+              <a:ext cx="428196" cy="439694"/>
+            </a:xfrm>
+            <a:prstGeom prst="ellipse">
+              <a:avLst/>
+            </a:prstGeom>
+          </p:spPr>
+          <p:style>
+            <a:lnRef idx="1">
+              <a:schemeClr val="dk1"/>
+            </a:lnRef>
+            <a:fillRef idx="2">
+              <a:schemeClr val="dk1"/>
+            </a:fillRef>
+            <a:effectRef idx="1">
+              <a:schemeClr val="dk1"/>
+            </a:effectRef>
+            <a:fontRef idx="minor">
+              <a:schemeClr val="dk1"/>
+            </a:fontRef>
+          </p:style>
+          <p:txBody>
+            <a:bodyPr rtlCol="0" anchor="ctr"/>
+            <a:lstStyle/>
+            <a:p>
+              <a:pPr algn="ctr"/>
+              <a:endParaRPr lang="en-US" sz="1400"/>
+            </a:p>
+          </p:txBody>
+        </p:sp>
+        <p:sp>
+          <p:nvSpPr>
+            <p:cNvPr id="22" name="Oval 21"/>
+            <p:cNvSpPr/>
+            <p:nvPr/>
+          </p:nvSpPr>
+          <p:spPr>
+            <a:xfrm>
+              <a:off x="6790282" y="1439486"/>
+              <a:ext cx="428196" cy="439694"/>
+            </a:xfrm>
+            <a:prstGeom prst="ellipse">
+              <a:avLst/>
+            </a:prstGeom>
+          </p:spPr>
+          <p:style>
+            <a:lnRef idx="1">
+              <a:schemeClr val="dk1"/>
+            </a:lnRef>
+            <a:fillRef idx="2">
+              <a:schemeClr val="dk1"/>
+            </a:fillRef>
+            <a:effectRef idx="1">
+              <a:schemeClr val="dk1"/>
+            </a:effectRef>
+            <a:fontRef idx="minor">
+              <a:schemeClr val="dk1"/>
+            </a:fontRef>
+          </p:style>
+          <p:txBody>
+            <a:bodyPr rtlCol="0" anchor="ctr"/>
+            <a:lstStyle/>
+            <a:p>
+              <a:pPr algn="ctr"/>
+              <a:endParaRPr lang="en-US" sz="1400"/>
+            </a:p>
+          </p:txBody>
+        </p:sp>
+        <p:sp>
+          <p:nvSpPr>
+            <p:cNvPr id="17" name="Left Arrow 16"/>
+            <p:cNvSpPr/>
+            <p:nvPr/>
+          </p:nvSpPr>
+          <p:spPr>
+            <a:xfrm rot="18951212">
+              <a:off x="3548097" y="3485772"/>
+              <a:ext cx="2968579" cy="1468759"/>
+            </a:xfrm>
+            <a:prstGeom prst="leftArrow">
+              <a:avLst/>
+            </a:prstGeom>
+          </p:spPr>
+          <p:style>
+            <a:lnRef idx="1">
+              <a:schemeClr val="dk1"/>
+            </a:lnRef>
+            <a:fillRef idx="2">
+              <a:schemeClr val="dk1"/>
+            </a:fillRef>
+            <a:effectRef idx="1">
+              <a:schemeClr val="dk1"/>
+            </a:effectRef>
+            <a:fontRef idx="minor">
+              <a:schemeClr val="dk1"/>
+            </a:fontRef>
+          </p:style>
+          <p:txBody>
+            <a:bodyPr rtlCol="0" anchor="ctr"/>
+            <a:lstStyle/>
+            <a:p>
+              <a:pPr algn="ctr"/>
+              <a:r>
+                <a:rPr lang="en-US" sz="2400" dirty="0" smtClean="0"/>
+                <a:t>fetch</a:t>
+              </a:r>
+              <a:endParaRPr lang="en-US" sz="2400" dirty="0"/>
+            </a:p>
+          </p:txBody>
+        </p:sp>
+        <p:sp>
+          <p:nvSpPr>
+            <p:cNvPr id="18" name="Oval 17"/>
+            <p:cNvSpPr/>
+            <p:nvPr/>
+          </p:nvSpPr>
+          <p:spPr>
+            <a:xfrm>
+              <a:off x="6305531" y="1461162"/>
+              <a:ext cx="428196" cy="439694"/>
+            </a:xfrm>
+            <a:prstGeom prst="ellipse">
+              <a:avLst/>
+            </a:prstGeom>
+          </p:spPr>
+          <p:style>
+            <a:lnRef idx="2">
+              <a:schemeClr val="accent2"/>
+            </a:lnRef>
+            <a:fillRef idx="1">
+              <a:schemeClr val="lt1"/>
+            </a:fillRef>
+            <a:effectRef idx="0">
+              <a:schemeClr val="accent2"/>
+            </a:effectRef>
+            <a:fontRef idx="minor">
+              <a:schemeClr val="dk1"/>
+            </a:fontRef>
+          </p:style>
+          <p:txBody>
+            <a:bodyPr rtlCol="0" anchor="ctr"/>
+            <a:lstStyle/>
+            <a:p>
+              <a:pPr algn="ctr"/>
+              <a:endParaRPr lang="en-US" sz="1400"/>
+            </a:p>
+          </p:txBody>
+        </p:sp>
+        <p:sp>
+          <p:nvSpPr>
+            <p:cNvPr id="19" name="Oval 18"/>
+            <p:cNvSpPr/>
+            <p:nvPr/>
+          </p:nvSpPr>
+          <p:spPr>
+            <a:xfrm>
+              <a:off x="2882916" y="4663059"/>
+              <a:ext cx="428196" cy="439694"/>
+            </a:xfrm>
+            <a:prstGeom prst="ellipse">
+              <a:avLst/>
+            </a:prstGeom>
+          </p:spPr>
+          <p:style>
+            <a:lnRef idx="2">
+              <a:schemeClr val="accent2"/>
+            </a:lnRef>
+            <a:fillRef idx="1">
+              <a:schemeClr val="lt1"/>
+            </a:fillRef>
+            <a:effectRef idx="0">
+              <a:schemeClr val="accent2"/>
+            </a:effectRef>
+            <a:fontRef idx="minor">
+              <a:schemeClr val="dk1"/>
+            </a:fontRef>
+          </p:style>
+          <p:txBody>
+            <a:bodyPr rtlCol="0" anchor="ctr"/>
+            <a:lstStyle/>
+            <a:p>
+              <a:pPr algn="ctr"/>
+              <a:endParaRPr lang="en-US" sz="1400"/>
+            </a:p>
+          </p:txBody>
+        </p:sp>
+        <p:sp>
+          <p:nvSpPr>
+            <p:cNvPr id="20" name="Oval 19"/>
+            <p:cNvSpPr/>
+            <p:nvPr/>
+          </p:nvSpPr>
+          <p:spPr>
+            <a:xfrm>
+              <a:off x="2882916" y="1417638"/>
+              <a:ext cx="428196" cy="439694"/>
+            </a:xfrm>
+            <a:prstGeom prst="ellipse">
+              <a:avLst/>
+            </a:prstGeom>
+          </p:spPr>
+          <p:style>
+            <a:lnRef idx="2">
+              <a:schemeClr val="accent2"/>
+            </a:lnRef>
+            <a:fillRef idx="1">
+              <a:schemeClr val="lt1"/>
+            </a:fillRef>
+            <a:effectRef idx="0">
+              <a:schemeClr val="accent2"/>
+            </a:effectRef>
+            <a:fontRef idx="minor">
+              <a:schemeClr val="dk1"/>
+            </a:fontRef>
+          </p:style>
+          <p:txBody>
+            <a:bodyPr rtlCol="0" anchor="ctr"/>
+            <a:lstStyle/>
+            <a:p>
+              <a:pPr algn="ctr"/>
+              <a:endParaRPr lang="en-US" sz="1400"/>
+            </a:p>
+          </p:txBody>
+        </p:sp>
+        <p:sp>
+          <p:nvSpPr>
+            <p:cNvPr id="23" name="Right Arrow 22"/>
+            <p:cNvSpPr/>
+            <p:nvPr/>
+          </p:nvSpPr>
+          <p:spPr>
+            <a:xfrm>
+              <a:off x="3928635" y="1558091"/>
+              <a:ext cx="1652172" cy="1515830"/>
+            </a:xfrm>
+            <a:prstGeom prst="rightArrow">
+              <a:avLst/>
+            </a:prstGeom>
+          </p:spPr>
+          <p:style>
+            <a:lnRef idx="1">
+              <a:schemeClr val="dk1"/>
+            </a:lnRef>
+            <a:fillRef idx="2">
+              <a:schemeClr val="dk1"/>
+            </a:fillRef>
+            <a:effectRef idx="1">
+              <a:schemeClr val="dk1"/>
+            </a:effectRef>
+            <a:fontRef idx="minor">
+              <a:schemeClr val="dk1"/>
+            </a:fontRef>
+          </p:style>
+          <p:txBody>
+            <a:bodyPr rtlCol="0" anchor="ctr"/>
+            <a:lstStyle/>
+            <a:p>
+              <a:pPr algn="ctr"/>
+              <a:r>
+                <a:rPr lang="en-US" dirty="0" smtClean="0"/>
+                <a:t>pull request</a:t>
+              </a:r>
+              <a:endParaRPr lang="en-US" dirty="0"/>
+            </a:p>
+          </p:txBody>
+        </p:sp>
+      </p:grpSp>
+      <p:grpSp>
+        <p:nvGrpSpPr>
+          <p:cNvPr id="24" name="Group 23"/>
+          <p:cNvGrpSpPr/>
+          <p:nvPr/>
+        </p:nvGrpSpPr>
+        <p:grpSpPr>
+          <a:xfrm>
+            <a:off x="-864278" y="61445"/>
+            <a:ext cx="6035620" cy="4880115"/>
+            <a:chOff x="768614" y="1487321"/>
+            <a:chExt cx="7918186" cy="4881775"/>
+          </a:xfrm>
+        </p:grpSpPr>
+        <p:sp>
+          <p:nvSpPr>
+            <p:cNvPr id="25" name="Cloud 24"/>
+            <p:cNvSpPr/>
+            <p:nvPr/>
+          </p:nvSpPr>
+          <p:spPr>
+            <a:xfrm>
+              <a:off x="768614" y="1771424"/>
+              <a:ext cx="7918186" cy="2139077"/>
+            </a:xfrm>
+            <a:prstGeom prst="cloud">
+              <a:avLst/>
+            </a:prstGeom>
+          </p:spPr>
+          <p:style>
+            <a:lnRef idx="1">
+              <a:schemeClr val="accent1"/>
+            </a:lnRef>
+            <a:fillRef idx="2">
+              <a:schemeClr val="accent1"/>
+            </a:fillRef>
+            <a:effectRef idx="1">
+              <a:schemeClr val="accent1"/>
+            </a:effectRef>
+            <a:fontRef idx="minor">
+              <a:schemeClr val="dk1"/>
+            </a:fontRef>
+          </p:style>
+          <p:txBody>
+            <a:bodyPr rtlCol="0" anchor="ctr"/>
+            <a:lstStyle/>
+            <a:p>
+              <a:pPr algn="ctr"/>
+              <a:endParaRPr lang="en-US" sz="4800" dirty="0"/>
+            </a:p>
+          </p:txBody>
+        </p:sp>
+        <p:sp>
+          <p:nvSpPr>
+            <p:cNvPr id="26" name="Can 25"/>
+            <p:cNvSpPr/>
+            <p:nvPr/>
+          </p:nvSpPr>
+          <p:spPr>
+            <a:xfrm>
+              <a:off x="5580807" y="1487321"/>
+              <a:ext cx="1871408" cy="1604308"/>
+            </a:xfrm>
+            <a:prstGeom prst="can">
+              <a:avLst/>
+            </a:prstGeom>
+          </p:spPr>
+          <p:style>
+            <a:lnRef idx="2">
+              <a:schemeClr val="accent1">
+                <a:shade val="50000"/>
+              </a:schemeClr>
+            </a:lnRef>
+            <a:fillRef idx="1">
+              <a:schemeClr val="accent1"/>
+            </a:fillRef>
+            <a:effectRef idx="0">
+              <a:schemeClr val="accent1"/>
+            </a:effectRef>
+            <a:fontRef idx="minor">
+              <a:schemeClr val="lt1"/>
+            </a:fontRef>
+          </p:style>
+          <p:txBody>
+            <a:bodyPr rtlCol="0" anchor="ctr"/>
+            <a:lstStyle/>
+            <a:p>
+              <a:pPr algn="ctr"/>
+              <a:r>
+                <a:rPr lang="en-US" sz="2000" dirty="0"/>
+                <a:t>upstream</a:t>
+              </a:r>
+              <a:br>
+                <a:rPr lang="en-US" sz="2000" dirty="0"/>
+              </a:br>
+              <a:r>
+                <a:rPr lang="en-US" sz="2000" dirty="0"/>
+                <a:t>(theirs)</a:t>
+              </a:r>
+            </a:p>
+          </p:txBody>
+        </p:sp>
+        <p:sp>
+          <p:nvSpPr>
+            <p:cNvPr id="27" name="Can 26"/>
+            <p:cNvSpPr/>
+            <p:nvPr/>
+          </p:nvSpPr>
+          <p:spPr>
+            <a:xfrm>
+              <a:off x="2057227" y="1487321"/>
+              <a:ext cx="1871408" cy="1604308"/>
+            </a:xfrm>
+            <a:prstGeom prst="can">
+              <a:avLst/>
+            </a:prstGeom>
+          </p:spPr>
+          <p:style>
+            <a:lnRef idx="2">
+              <a:schemeClr val="accent1">
+                <a:shade val="50000"/>
+              </a:schemeClr>
+            </a:lnRef>
+            <a:fillRef idx="1">
+              <a:schemeClr val="accent1"/>
+            </a:fillRef>
+            <a:effectRef idx="0">
+              <a:schemeClr val="accent1"/>
+            </a:effectRef>
+            <a:fontRef idx="minor">
+              <a:schemeClr val="lt1"/>
+            </a:fontRef>
+          </p:style>
+          <p:txBody>
+            <a:bodyPr rtlCol="0" anchor="ctr"/>
+            <a:lstStyle/>
+            <a:p>
+              <a:pPr algn="ctr"/>
+              <a:r>
+                <a:rPr lang="en-US" sz="2000" dirty="0"/>
+                <a:t>origin</a:t>
+              </a:r>
+              <a:br>
+                <a:rPr lang="en-US" sz="2000" dirty="0"/>
+              </a:br>
+              <a:r>
+                <a:rPr lang="en-US" sz="2000" dirty="0"/>
+                <a:t>(yours)</a:t>
+              </a:r>
+            </a:p>
+          </p:txBody>
+        </p:sp>
+        <p:sp>
+          <p:nvSpPr>
+            <p:cNvPr id="28" name="Can 27"/>
+            <p:cNvSpPr/>
+            <p:nvPr/>
+          </p:nvSpPr>
+          <p:spPr>
+            <a:xfrm>
+              <a:off x="2057227" y="4764788"/>
+              <a:ext cx="1871408" cy="1604308"/>
+            </a:xfrm>
+            <a:prstGeom prst="can">
+              <a:avLst/>
+            </a:prstGeom>
+          </p:spPr>
+          <p:style>
+            <a:lnRef idx="2">
+              <a:schemeClr val="accent1">
+                <a:shade val="50000"/>
+              </a:schemeClr>
+            </a:lnRef>
+            <a:fillRef idx="1">
+              <a:schemeClr val="accent1"/>
+            </a:fillRef>
+            <a:effectRef idx="0">
+              <a:schemeClr val="accent1"/>
+            </a:effectRef>
+            <a:fontRef idx="minor">
+              <a:schemeClr val="lt1"/>
+            </a:fontRef>
+          </p:style>
+          <p:txBody>
+            <a:bodyPr rtlCol="0" anchor="ctr"/>
+            <a:lstStyle/>
+            <a:p>
+              <a:pPr algn="ctr"/>
+              <a:r>
+                <a:rPr lang="en-US" sz="2000" dirty="0"/>
+                <a:t>local</a:t>
+              </a:r>
+              <a:br>
+                <a:rPr lang="en-US" sz="2000" dirty="0"/>
+              </a:br>
+              <a:r>
+                <a:rPr lang="en-US" sz="2000" dirty="0"/>
+                <a:t>(yours)</a:t>
+              </a:r>
+            </a:p>
+          </p:txBody>
+        </p:sp>
+        <p:cxnSp>
+          <p:nvCxnSpPr>
+            <p:cNvPr id="29" name="Straight Arrow Connector 28"/>
+            <p:cNvCxnSpPr>
+              <a:stCxn id="28" idx="1"/>
+            </p:cNvCxnSpPr>
+            <p:nvPr/>
+          </p:nvCxnSpPr>
+          <p:spPr>
+            <a:xfrm flipH="1" flipV="1">
+              <a:off x="2990911" y="3091629"/>
+              <a:ext cx="2020" cy="1673159"/>
+            </a:xfrm>
+            <a:prstGeom prst="straightConnector1">
+              <a:avLst/>
+            </a:prstGeom>
+            <a:ln>
+              <a:tailEnd type="arrow"/>
+            </a:ln>
+          </p:spPr>
+          <p:style>
+            <a:lnRef idx="2">
+              <a:schemeClr val="accent2"/>
+            </a:lnRef>
+            <a:fillRef idx="0">
+              <a:schemeClr val="accent2"/>
+            </a:fillRef>
+            <a:effectRef idx="1">
+              <a:schemeClr val="accent2"/>
+            </a:effectRef>
+            <a:fontRef idx="minor">
+              <a:schemeClr val="tx1"/>
+            </a:fontRef>
+          </p:style>
+        </p:cxnSp>
+        <p:cxnSp>
+          <p:nvCxnSpPr>
+            <p:cNvPr id="30" name="Straight Arrow Connector 29"/>
+            <p:cNvCxnSpPr>
+              <a:stCxn id="28" idx="4"/>
+              <a:endCxn id="26" idx="3"/>
+            </p:cNvCxnSpPr>
+            <p:nvPr/>
+          </p:nvCxnSpPr>
+          <p:spPr>
+            <a:xfrm flipV="1">
+              <a:off x="3928635" y="3091629"/>
+              <a:ext cx="2587876" cy="2475313"/>
+            </a:xfrm>
+            <a:prstGeom prst="straightConnector1">
+              <a:avLst/>
+            </a:prstGeom>
+            <a:ln w="57150" cmpd="sng">
+              <a:solidFill>
+                <a:srgbClr val="4F81BD"/>
+              </a:solidFill>
+              <a:tailEnd type="triangle" w="lg" len="lg"/>
+            </a:ln>
+          </p:spPr>
+          <p:style>
+            <a:lnRef idx="2">
+              <a:schemeClr val="accent1">
+                <a:shade val="50000"/>
+              </a:schemeClr>
+            </a:lnRef>
+            <a:fillRef idx="1">
+              <a:schemeClr val="accent1"/>
+            </a:fillRef>
+            <a:effectRef idx="0">
+              <a:schemeClr val="accent1"/>
+            </a:effectRef>
+            <a:fontRef idx="minor">
+              <a:schemeClr val="lt1"/>
+            </a:fontRef>
+          </p:style>
+        </p:cxnSp>
+        <p:sp>
+          <p:nvSpPr>
+            <p:cNvPr id="31" name="TextBox 30"/>
+            <p:cNvSpPr txBox="1"/>
+            <p:nvPr/>
+          </p:nvSpPr>
+          <p:spPr>
+            <a:xfrm>
+              <a:off x="4392557" y="3455745"/>
+              <a:ext cx="1665742" cy="400246"/>
+            </a:xfrm>
+            <a:prstGeom prst="rect">
+              <a:avLst/>
+            </a:prstGeom>
+            <a:noFill/>
+          </p:spPr>
+          <p:txBody>
+            <a:bodyPr wrap="square" rtlCol="0">
+              <a:spAutoFit/>
+            </a:bodyPr>
+            <a:lstStyle/>
+            <a:p>
+              <a:r>
+                <a:rPr lang="en-US" sz="2000" dirty="0" smtClean="0"/>
+                <a:t>upstream</a:t>
+              </a:r>
+            </a:p>
+          </p:txBody>
+        </p:sp>
+        <p:sp>
+          <p:nvSpPr>
+            <p:cNvPr id="32" name="Left Arrow 31"/>
+            <p:cNvSpPr/>
+            <p:nvPr/>
+          </p:nvSpPr>
+          <p:spPr>
+            <a:xfrm rot="16200000">
+              <a:off x="2083196" y="3361012"/>
+              <a:ext cx="1819262" cy="1336927"/>
+            </a:xfrm>
+            <a:prstGeom prst="leftArrow">
+              <a:avLst/>
+            </a:prstGeom>
+          </p:spPr>
+          <p:style>
+            <a:lnRef idx="2">
+              <a:schemeClr val="accent1">
+                <a:shade val="50000"/>
+              </a:schemeClr>
+            </a:lnRef>
+            <a:fillRef idx="1">
+              <a:schemeClr val="accent1"/>
+            </a:fillRef>
+            <a:effectRef idx="0">
+              <a:schemeClr val="accent1"/>
+            </a:effectRef>
+            <a:fontRef idx="minor">
+              <a:schemeClr val="lt1"/>
+            </a:fontRef>
+          </p:style>
+          <p:txBody>
+            <a:bodyPr rtlCol="0" anchor="ctr"/>
+            <a:lstStyle/>
+            <a:p>
+              <a:pPr algn="ctr"/>
+              <a:r>
+                <a:rPr lang="en-US" sz="2000" dirty="0"/>
+                <a:t>clone</a:t>
+              </a:r>
+            </a:p>
+          </p:txBody>
+        </p:sp>
+        <p:sp>
+          <p:nvSpPr>
+            <p:cNvPr id="33" name="Left Arrow 32"/>
+            <p:cNvSpPr/>
+            <p:nvPr/>
+          </p:nvSpPr>
+          <p:spPr>
+            <a:xfrm>
+              <a:off x="3761545" y="1654430"/>
+              <a:ext cx="1819262" cy="1336927"/>
+            </a:xfrm>
+            <a:prstGeom prst="leftArrow">
+              <a:avLst/>
+            </a:prstGeom>
+          </p:spPr>
+          <p:style>
+            <a:lnRef idx="2">
+              <a:schemeClr val="accent1">
+                <a:shade val="50000"/>
+              </a:schemeClr>
+            </a:lnRef>
+            <a:fillRef idx="1">
+              <a:schemeClr val="accent1"/>
+            </a:fillRef>
+            <a:effectRef idx="0">
+              <a:schemeClr val="accent1"/>
+            </a:effectRef>
+            <a:fontRef idx="minor">
+              <a:schemeClr val="lt1"/>
+            </a:fontRef>
+          </p:style>
+          <p:txBody>
+            <a:bodyPr rtlCol="0" anchor="ctr"/>
+            <a:lstStyle/>
+            <a:p>
+              <a:pPr algn="ctr"/>
+              <a:r>
+                <a:rPr lang="en-US" sz="2000" dirty="0"/>
+                <a:t>fork</a:t>
+              </a:r>
+            </a:p>
+          </p:txBody>
+        </p:sp>
+      </p:grpSp>
+      <p:sp>
+        <p:nvSpPr>
+          <p:cNvPr id="34" name="TextBox 33"/>
+          <p:cNvSpPr txBox="1"/>
+          <p:nvPr/>
+        </p:nvSpPr>
+        <p:spPr>
+          <a:xfrm>
+            <a:off x="5080078" y="70576"/>
+            <a:ext cx="2624300" cy="646331"/>
+          </a:xfrm>
+          <a:prstGeom prst="rect">
+            <a:avLst/>
+          </a:prstGeom>
+          <a:noFill/>
+        </p:spPr>
+        <p:txBody>
+          <a:bodyPr wrap="square" rtlCol="0">
+            <a:spAutoFit/>
+          </a:bodyPr>
+          <a:lstStyle/>
+          <a:p>
+            <a:r>
+              <a:rPr lang="en-US" sz="3600" dirty="0" smtClean="0"/>
+              <a:t>Setup</a:t>
+            </a:r>
+            <a:endParaRPr lang="en-US" sz="3600" dirty="0"/>
+          </a:p>
+        </p:txBody>
+      </p:sp>
+      <p:sp>
+        <p:nvSpPr>
+          <p:cNvPr id="35" name="TextBox 34"/>
+          <p:cNvSpPr txBox="1"/>
+          <p:nvPr/>
+        </p:nvSpPr>
+        <p:spPr>
+          <a:xfrm>
+            <a:off x="6554810" y="5780850"/>
+            <a:ext cx="2630510" cy="646331"/>
+          </a:xfrm>
+          <a:prstGeom prst="rect">
+            <a:avLst/>
+          </a:prstGeom>
+          <a:noFill/>
+        </p:spPr>
+        <p:txBody>
+          <a:bodyPr wrap="square" rtlCol="0">
+            <a:spAutoFit/>
+          </a:bodyPr>
+          <a:lstStyle/>
+          <a:p>
+            <a:r>
+              <a:rPr lang="en-US" sz="3600" dirty="0" smtClean="0"/>
+              <a:t>Contribute</a:t>
+            </a:r>
+            <a:endParaRPr lang="en-US" sz="3600" dirty="0"/>
+          </a:p>
+        </p:txBody>
+      </p:sp>
+    </p:spTree>
+    <p:extLst>
+      <p:ext uri="{BB962C8B-B14F-4D97-AF65-F5344CB8AC3E}">
+        <p14:creationId xmlns:p14="http://schemas.microsoft.com/office/powerpoint/2010/main" val="3189501120"/>
+      </p:ext>
+    </p:extLst>
+  </p:cSld>
+  <p:clrMapOvr>
+    <a:masterClrMapping/>
+  </p:clrMapOvr>
+  <p:timing>
+    <p:tnLst>
+      <p:par>
+        <p:cTn xmlns:p14="http://schemas.microsoft.com/office/powerpoint/2010/main" id="1" dur="indefinite" restart="never" nodeType="tmRoot"/>
+      </p:par>
+    </p:tnLst>
+  </p:timing>
+</p:sld>
+</file>
+
 <file path=ppt/slides/slide5.xml><?xml version="1.0" encoding="utf-8"?>
 <p:sld xmlns:a="http://schemas.openxmlformats.org/drawingml/2006/main" xmlns:r="http://schemas.openxmlformats.org/officeDocument/2006/relationships" xmlns:p="http://schemas.openxmlformats.org/presentationml/2006/main">
   <p:cSld>
@@ -32919,385 +34087,400 @@
           </a:p>
         </p:txBody>
       </p:sp>
-      <p:sp>
-        <p:nvSpPr>
-          <p:cNvPr id="4" name="Cloud 3"/>
-          <p:cNvSpPr/>
-          <p:nvPr/>
-        </p:nvSpPr>
-        <p:spPr>
-          <a:xfrm>
-            <a:off x="768614" y="1771424"/>
-            <a:ext cx="7918186" cy="2139077"/>
-          </a:xfrm>
-          <a:prstGeom prst="cloud">
-            <a:avLst/>
-          </a:prstGeom>
-        </p:spPr>
-        <p:style>
-          <a:lnRef idx="1">
-            <a:schemeClr val="accent1"/>
-          </a:lnRef>
-          <a:fillRef idx="2">
-            <a:schemeClr val="accent1"/>
-          </a:fillRef>
-          <a:effectRef idx="1">
-            <a:schemeClr val="accent1"/>
-          </a:effectRef>
-          <a:fontRef idx="minor">
-            <a:schemeClr val="dk1"/>
-          </a:fontRef>
-        </p:style>
-        <p:txBody>
-          <a:bodyPr rtlCol="0" anchor="ctr"/>
-          <a:lstStyle/>
-          <a:p>
-            <a:pPr algn="ctr"/>
-            <a:endParaRPr lang="en-US" sz="6000" dirty="0"/>
-          </a:p>
-        </p:txBody>
-      </p:sp>
-      <p:sp>
-        <p:nvSpPr>
-          <p:cNvPr id="6" name="Can 5"/>
-          <p:cNvSpPr/>
-          <p:nvPr/>
-        </p:nvSpPr>
-        <p:spPr>
-          <a:xfrm>
-            <a:off x="5580807" y="1487321"/>
-            <a:ext cx="1871408" cy="1604308"/>
-          </a:xfrm>
-          <a:prstGeom prst="can">
-            <a:avLst/>
-          </a:prstGeom>
-        </p:spPr>
-        <p:style>
-          <a:lnRef idx="2">
-            <a:schemeClr val="accent1">
-              <a:shade val="50000"/>
-            </a:schemeClr>
-          </a:lnRef>
-          <a:fillRef idx="1">
-            <a:schemeClr val="accent1"/>
-          </a:fillRef>
-          <a:effectRef idx="0">
-            <a:schemeClr val="accent1"/>
-          </a:effectRef>
-          <a:fontRef idx="minor">
-            <a:schemeClr val="lt1"/>
-          </a:fontRef>
-        </p:style>
-        <p:txBody>
-          <a:bodyPr rtlCol="0" anchor="ctr"/>
-          <a:lstStyle/>
-          <a:p>
-            <a:pPr algn="ctr"/>
-            <a:r>
-              <a:rPr lang="en-US" sz="2800" dirty="0"/>
-              <a:t>upstream</a:t>
-            </a:r>
-            <a:br>
-              <a:rPr lang="en-US" sz="2800" dirty="0"/>
-            </a:br>
-            <a:r>
-              <a:rPr lang="en-US" sz="2800" dirty="0"/>
-              <a:t>(theirs)</a:t>
-            </a:r>
-          </a:p>
-        </p:txBody>
-      </p:sp>
-      <p:sp>
-        <p:nvSpPr>
-          <p:cNvPr id="7" name="Can 6"/>
-          <p:cNvSpPr/>
-          <p:nvPr/>
-        </p:nvSpPr>
-        <p:spPr>
-          <a:xfrm>
-            <a:off x="2057227" y="1487321"/>
-            <a:ext cx="1871408" cy="1604308"/>
-          </a:xfrm>
-          <a:prstGeom prst="can">
-            <a:avLst/>
-          </a:prstGeom>
-        </p:spPr>
-        <p:style>
-          <a:lnRef idx="2">
-            <a:schemeClr val="accent1">
-              <a:shade val="50000"/>
-            </a:schemeClr>
-          </a:lnRef>
-          <a:fillRef idx="1">
-            <a:schemeClr val="accent1"/>
-          </a:fillRef>
-          <a:effectRef idx="0">
-            <a:schemeClr val="accent1"/>
-          </a:effectRef>
-          <a:fontRef idx="minor">
-            <a:schemeClr val="lt1"/>
-          </a:fontRef>
-        </p:style>
-        <p:txBody>
-          <a:bodyPr rtlCol="0" anchor="ctr"/>
-          <a:lstStyle/>
-          <a:p>
-            <a:pPr algn="ctr"/>
-            <a:r>
-              <a:rPr lang="en-US" sz="2800" dirty="0"/>
-              <a:t>origin</a:t>
-            </a:r>
-            <a:br>
-              <a:rPr lang="en-US" sz="2800" dirty="0"/>
-            </a:br>
-            <a:r>
-              <a:rPr lang="en-US" sz="2800" dirty="0"/>
-              <a:t>(yours)</a:t>
-            </a:r>
-          </a:p>
-        </p:txBody>
-      </p:sp>
-      <p:sp>
-        <p:nvSpPr>
-          <p:cNvPr id="9" name="Can 8"/>
-          <p:cNvSpPr/>
-          <p:nvPr/>
-        </p:nvSpPr>
-        <p:spPr>
-          <a:xfrm>
-            <a:off x="2057227" y="4764788"/>
-            <a:ext cx="1871408" cy="1604308"/>
-          </a:xfrm>
-          <a:prstGeom prst="can">
-            <a:avLst/>
-          </a:prstGeom>
-        </p:spPr>
-        <p:style>
-          <a:lnRef idx="2">
-            <a:schemeClr val="accent1">
-              <a:shade val="50000"/>
-            </a:schemeClr>
-          </a:lnRef>
-          <a:fillRef idx="1">
-            <a:schemeClr val="accent1"/>
-          </a:fillRef>
-          <a:effectRef idx="0">
-            <a:schemeClr val="accent1"/>
-          </a:effectRef>
-          <a:fontRef idx="minor">
-            <a:schemeClr val="lt1"/>
-          </a:fontRef>
-        </p:style>
-        <p:txBody>
-          <a:bodyPr rtlCol="0" anchor="ctr"/>
-          <a:lstStyle/>
-          <a:p>
-            <a:pPr algn="ctr"/>
-            <a:r>
-              <a:rPr lang="en-US" sz="2800" dirty="0"/>
-              <a:t>local</a:t>
-            </a:r>
-            <a:br>
-              <a:rPr lang="en-US" sz="2800" dirty="0"/>
-            </a:br>
-            <a:r>
-              <a:rPr lang="en-US" sz="2800" dirty="0"/>
-              <a:t>(yours)</a:t>
-            </a:r>
-          </a:p>
-        </p:txBody>
-      </p:sp>
-      <p:cxnSp>
-        <p:nvCxnSpPr>
-          <p:cNvPr id="5" name="Straight Arrow Connector 4"/>
-          <p:cNvCxnSpPr>
-            <a:stCxn id="9" idx="1"/>
-          </p:cNvCxnSpPr>
-          <p:nvPr/>
-        </p:nvCxnSpPr>
-        <p:spPr>
-          <a:xfrm flipH="1" flipV="1">
-            <a:off x="2990911" y="3091629"/>
-            <a:ext cx="2020" cy="1673159"/>
-          </a:xfrm>
-          <a:prstGeom prst="straightConnector1">
-            <a:avLst/>
-          </a:prstGeom>
-          <a:ln>
-            <a:tailEnd type="arrow"/>
-          </a:ln>
-        </p:spPr>
-        <p:style>
-          <a:lnRef idx="2">
-            <a:schemeClr val="accent2"/>
-          </a:lnRef>
-          <a:fillRef idx="0">
-            <a:schemeClr val="accent2"/>
-          </a:fillRef>
-          <a:effectRef idx="1">
-            <a:schemeClr val="accent2"/>
-          </a:effectRef>
-          <a:fontRef idx="minor">
-            <a:schemeClr val="tx1"/>
-          </a:fontRef>
-        </p:style>
-      </p:cxnSp>
-      <p:cxnSp>
-        <p:nvCxnSpPr>
-          <p:cNvPr id="11" name="Straight Arrow Connector 10"/>
-          <p:cNvCxnSpPr>
-            <a:stCxn id="9" idx="4"/>
-            <a:endCxn id="6" idx="3"/>
-          </p:cNvCxnSpPr>
-          <p:nvPr/>
-        </p:nvCxnSpPr>
-        <p:spPr>
-          <a:xfrm flipV="1">
-            <a:off x="3928635" y="3091629"/>
-            <a:ext cx="2587876" cy="2475313"/>
-          </a:xfrm>
-          <a:prstGeom prst="straightConnector1">
-            <a:avLst/>
-          </a:prstGeom>
-          <a:ln w="57150" cmpd="sng">
-            <a:solidFill>
-              <a:srgbClr val="4F81BD"/>
-            </a:solidFill>
-            <a:tailEnd type="triangle" w="lg" len="lg"/>
-          </a:ln>
-        </p:spPr>
-        <p:style>
-          <a:lnRef idx="2">
-            <a:schemeClr val="accent1">
-              <a:shade val="50000"/>
-            </a:schemeClr>
-          </a:lnRef>
-          <a:fillRef idx="1">
-            <a:schemeClr val="accent1"/>
-          </a:fillRef>
-          <a:effectRef idx="0">
-            <a:schemeClr val="accent1"/>
-          </a:effectRef>
-          <a:fontRef idx="minor">
-            <a:schemeClr val="lt1"/>
-          </a:fontRef>
-        </p:style>
-      </p:cxnSp>
-      <p:sp>
-        <p:nvSpPr>
-          <p:cNvPr id="14" name="TextBox 13"/>
-          <p:cNvSpPr txBox="1"/>
-          <p:nvPr/>
-        </p:nvSpPr>
-        <p:spPr>
-          <a:xfrm>
-            <a:off x="5332190" y="4027482"/>
-            <a:ext cx="1401537" cy="461665"/>
-          </a:xfrm>
-          <a:prstGeom prst="rect">
-            <a:avLst/>
-          </a:prstGeom>
-          <a:noFill/>
-        </p:spPr>
-        <p:txBody>
-          <a:bodyPr wrap="square" rtlCol="0">
-            <a:spAutoFit/>
-          </a:bodyPr>
-          <a:lstStyle/>
-          <a:p>
-            <a:r>
-              <a:rPr lang="en-US" sz="2400" dirty="0" smtClean="0"/>
-              <a:t>upstream</a:t>
-            </a:r>
-          </a:p>
-        </p:txBody>
-      </p:sp>
-      <p:sp>
-        <p:nvSpPr>
-          <p:cNvPr id="12" name="Left Arrow 11"/>
-          <p:cNvSpPr/>
-          <p:nvPr/>
-        </p:nvSpPr>
-        <p:spPr>
-          <a:xfrm rot="16200000">
-            <a:off x="2083196" y="3361012"/>
-            <a:ext cx="1819262" cy="1336927"/>
-          </a:xfrm>
-          <a:prstGeom prst="leftArrow">
-            <a:avLst/>
-          </a:prstGeom>
-        </p:spPr>
-        <p:style>
-          <a:lnRef idx="2">
-            <a:schemeClr val="accent1">
-              <a:shade val="50000"/>
-            </a:schemeClr>
-          </a:lnRef>
-          <a:fillRef idx="1">
-            <a:schemeClr val="accent1"/>
-          </a:fillRef>
-          <a:effectRef idx="0">
-            <a:schemeClr val="accent1"/>
-          </a:effectRef>
-          <a:fontRef idx="minor">
-            <a:schemeClr val="lt1"/>
-          </a:fontRef>
-        </p:style>
-        <p:txBody>
-          <a:bodyPr rtlCol="0" anchor="ctr"/>
-          <a:lstStyle/>
-          <a:p>
-            <a:pPr algn="ctr"/>
-            <a:r>
-              <a:rPr lang="en-US" sz="2800" dirty="0"/>
-              <a:t>clone</a:t>
-            </a:r>
-          </a:p>
-        </p:txBody>
-      </p:sp>
-      <p:sp>
-        <p:nvSpPr>
-          <p:cNvPr id="13" name="Left Arrow 12"/>
-          <p:cNvSpPr/>
-          <p:nvPr/>
-        </p:nvSpPr>
-        <p:spPr>
-          <a:xfrm>
-            <a:off x="3761545" y="1654430"/>
-            <a:ext cx="1819262" cy="1336927"/>
-          </a:xfrm>
-          <a:prstGeom prst="leftArrow">
-            <a:avLst/>
-          </a:prstGeom>
-        </p:spPr>
-        <p:style>
-          <a:lnRef idx="2">
-            <a:schemeClr val="accent1">
-              <a:shade val="50000"/>
-            </a:schemeClr>
-          </a:lnRef>
-          <a:fillRef idx="1">
-            <a:schemeClr val="accent1"/>
-          </a:fillRef>
-          <a:effectRef idx="0">
-            <a:schemeClr val="accent1"/>
-          </a:effectRef>
-          <a:fontRef idx="minor">
-            <a:schemeClr val="lt1"/>
-          </a:fontRef>
-        </p:style>
-        <p:txBody>
-          <a:bodyPr rtlCol="0" anchor="ctr"/>
-          <a:lstStyle/>
-          <a:p>
-            <a:pPr algn="ctr"/>
-            <a:r>
-              <a:rPr lang="en-US" sz="2800" dirty="0"/>
-              <a:t>fork</a:t>
-            </a:r>
-          </a:p>
-        </p:txBody>
-      </p:sp>
+      <p:grpSp>
+        <p:nvGrpSpPr>
+          <p:cNvPr id="8" name="Group 7"/>
+          <p:cNvGrpSpPr/>
+          <p:nvPr/>
+        </p:nvGrpSpPr>
+        <p:grpSpPr>
+          <a:xfrm>
+            <a:off x="768614" y="1487321"/>
+            <a:ext cx="7918186" cy="4881775"/>
+            <a:chOff x="768614" y="1487321"/>
+            <a:chExt cx="7918186" cy="4881775"/>
+          </a:xfrm>
+        </p:grpSpPr>
+        <p:sp>
+          <p:nvSpPr>
+            <p:cNvPr id="4" name="Cloud 3"/>
+            <p:cNvSpPr/>
+            <p:nvPr/>
+          </p:nvSpPr>
+          <p:spPr>
+            <a:xfrm>
+              <a:off x="768614" y="1771424"/>
+              <a:ext cx="7918186" cy="2139077"/>
+            </a:xfrm>
+            <a:prstGeom prst="cloud">
+              <a:avLst/>
+            </a:prstGeom>
+          </p:spPr>
+          <p:style>
+            <a:lnRef idx="1">
+              <a:schemeClr val="accent1"/>
+            </a:lnRef>
+            <a:fillRef idx="2">
+              <a:schemeClr val="accent1"/>
+            </a:fillRef>
+            <a:effectRef idx="1">
+              <a:schemeClr val="accent1"/>
+            </a:effectRef>
+            <a:fontRef idx="minor">
+              <a:schemeClr val="dk1"/>
+            </a:fontRef>
+          </p:style>
+          <p:txBody>
+            <a:bodyPr rtlCol="0" anchor="ctr"/>
+            <a:lstStyle/>
+            <a:p>
+              <a:pPr algn="ctr"/>
+              <a:endParaRPr lang="en-US" sz="6000" dirty="0"/>
+            </a:p>
+          </p:txBody>
+        </p:sp>
+        <p:sp>
+          <p:nvSpPr>
+            <p:cNvPr id="6" name="Can 5"/>
+            <p:cNvSpPr/>
+            <p:nvPr/>
+          </p:nvSpPr>
+          <p:spPr>
+            <a:xfrm>
+              <a:off x="5580807" y="1487321"/>
+              <a:ext cx="1871408" cy="1604308"/>
+            </a:xfrm>
+            <a:prstGeom prst="can">
+              <a:avLst/>
+            </a:prstGeom>
+          </p:spPr>
+          <p:style>
+            <a:lnRef idx="2">
+              <a:schemeClr val="accent1">
+                <a:shade val="50000"/>
+              </a:schemeClr>
+            </a:lnRef>
+            <a:fillRef idx="1">
+              <a:schemeClr val="accent1"/>
+            </a:fillRef>
+            <a:effectRef idx="0">
+              <a:schemeClr val="accent1"/>
+            </a:effectRef>
+            <a:fontRef idx="minor">
+              <a:schemeClr val="lt1"/>
+            </a:fontRef>
+          </p:style>
+          <p:txBody>
+            <a:bodyPr rtlCol="0" anchor="ctr"/>
+            <a:lstStyle/>
+            <a:p>
+              <a:pPr algn="ctr"/>
+              <a:r>
+                <a:rPr lang="en-US" sz="2800" dirty="0"/>
+                <a:t>upstream</a:t>
+              </a:r>
+              <a:br>
+                <a:rPr lang="en-US" sz="2800" dirty="0"/>
+              </a:br>
+              <a:r>
+                <a:rPr lang="en-US" sz="2800" dirty="0"/>
+                <a:t>(theirs)</a:t>
+              </a:r>
+            </a:p>
+          </p:txBody>
+        </p:sp>
+        <p:sp>
+          <p:nvSpPr>
+            <p:cNvPr id="7" name="Can 6"/>
+            <p:cNvSpPr/>
+            <p:nvPr/>
+          </p:nvSpPr>
+          <p:spPr>
+            <a:xfrm>
+              <a:off x="2057227" y="1487321"/>
+              <a:ext cx="1871408" cy="1604308"/>
+            </a:xfrm>
+            <a:prstGeom prst="can">
+              <a:avLst/>
+            </a:prstGeom>
+          </p:spPr>
+          <p:style>
+            <a:lnRef idx="2">
+              <a:schemeClr val="accent1">
+                <a:shade val="50000"/>
+              </a:schemeClr>
+            </a:lnRef>
+            <a:fillRef idx="1">
+              <a:schemeClr val="accent1"/>
+            </a:fillRef>
+            <a:effectRef idx="0">
+              <a:schemeClr val="accent1"/>
+            </a:effectRef>
+            <a:fontRef idx="minor">
+              <a:schemeClr val="lt1"/>
+            </a:fontRef>
+          </p:style>
+          <p:txBody>
+            <a:bodyPr rtlCol="0" anchor="ctr"/>
+            <a:lstStyle/>
+            <a:p>
+              <a:pPr algn="ctr"/>
+              <a:r>
+                <a:rPr lang="en-US" sz="2800" dirty="0"/>
+                <a:t>origin</a:t>
+              </a:r>
+              <a:br>
+                <a:rPr lang="en-US" sz="2800" dirty="0"/>
+              </a:br>
+              <a:r>
+                <a:rPr lang="en-US" sz="2800" dirty="0"/>
+                <a:t>(yours)</a:t>
+              </a:r>
+            </a:p>
+          </p:txBody>
+        </p:sp>
+        <p:sp>
+          <p:nvSpPr>
+            <p:cNvPr id="9" name="Can 8"/>
+            <p:cNvSpPr/>
+            <p:nvPr/>
+          </p:nvSpPr>
+          <p:spPr>
+            <a:xfrm>
+              <a:off x="2057227" y="4764788"/>
+              <a:ext cx="1871408" cy="1604308"/>
+            </a:xfrm>
+            <a:prstGeom prst="can">
+              <a:avLst/>
+            </a:prstGeom>
+          </p:spPr>
+          <p:style>
+            <a:lnRef idx="2">
+              <a:schemeClr val="accent1">
+                <a:shade val="50000"/>
+              </a:schemeClr>
+            </a:lnRef>
+            <a:fillRef idx="1">
+              <a:schemeClr val="accent1"/>
+            </a:fillRef>
+            <a:effectRef idx="0">
+              <a:schemeClr val="accent1"/>
+            </a:effectRef>
+            <a:fontRef idx="minor">
+              <a:schemeClr val="lt1"/>
+            </a:fontRef>
+          </p:style>
+          <p:txBody>
+            <a:bodyPr rtlCol="0" anchor="ctr"/>
+            <a:lstStyle/>
+            <a:p>
+              <a:pPr algn="ctr"/>
+              <a:r>
+                <a:rPr lang="en-US" sz="2800" dirty="0"/>
+                <a:t>local</a:t>
+              </a:r>
+              <a:br>
+                <a:rPr lang="en-US" sz="2800" dirty="0"/>
+              </a:br>
+              <a:r>
+                <a:rPr lang="en-US" sz="2800" dirty="0"/>
+                <a:t>(yours)</a:t>
+              </a:r>
+            </a:p>
+          </p:txBody>
+        </p:sp>
+        <p:cxnSp>
+          <p:nvCxnSpPr>
+            <p:cNvPr id="5" name="Straight Arrow Connector 4"/>
+            <p:cNvCxnSpPr>
+              <a:stCxn id="9" idx="1"/>
+            </p:cNvCxnSpPr>
+            <p:nvPr/>
+          </p:nvCxnSpPr>
+          <p:spPr>
+            <a:xfrm flipH="1" flipV="1">
+              <a:off x="2990911" y="3091629"/>
+              <a:ext cx="2020" cy="1673159"/>
+            </a:xfrm>
+            <a:prstGeom prst="straightConnector1">
+              <a:avLst/>
+            </a:prstGeom>
+            <a:ln>
+              <a:tailEnd type="arrow"/>
+            </a:ln>
+          </p:spPr>
+          <p:style>
+            <a:lnRef idx="2">
+              <a:schemeClr val="accent2"/>
+            </a:lnRef>
+            <a:fillRef idx="0">
+              <a:schemeClr val="accent2"/>
+            </a:fillRef>
+            <a:effectRef idx="1">
+              <a:schemeClr val="accent2"/>
+            </a:effectRef>
+            <a:fontRef idx="minor">
+              <a:schemeClr val="tx1"/>
+            </a:fontRef>
+          </p:style>
+        </p:cxnSp>
+        <p:cxnSp>
+          <p:nvCxnSpPr>
+            <p:cNvPr id="11" name="Straight Arrow Connector 10"/>
+            <p:cNvCxnSpPr>
+              <a:stCxn id="9" idx="4"/>
+              <a:endCxn id="6" idx="3"/>
+            </p:cNvCxnSpPr>
+            <p:nvPr/>
+          </p:nvCxnSpPr>
+          <p:spPr>
+            <a:xfrm flipV="1">
+              <a:off x="3928635" y="3091629"/>
+              <a:ext cx="2587876" cy="2475313"/>
+            </a:xfrm>
+            <a:prstGeom prst="straightConnector1">
+              <a:avLst/>
+            </a:prstGeom>
+            <a:ln w="57150" cmpd="sng">
+              <a:solidFill>
+                <a:srgbClr val="4F81BD"/>
+              </a:solidFill>
+              <a:tailEnd type="triangle" w="lg" len="lg"/>
+            </a:ln>
+          </p:spPr>
+          <p:style>
+            <a:lnRef idx="2">
+              <a:schemeClr val="accent1">
+                <a:shade val="50000"/>
+              </a:schemeClr>
+            </a:lnRef>
+            <a:fillRef idx="1">
+              <a:schemeClr val="accent1"/>
+            </a:fillRef>
+            <a:effectRef idx="0">
+              <a:schemeClr val="accent1"/>
+            </a:effectRef>
+            <a:fontRef idx="minor">
+              <a:schemeClr val="lt1"/>
+            </a:fontRef>
+          </p:style>
+        </p:cxnSp>
+        <p:sp>
+          <p:nvSpPr>
+            <p:cNvPr id="14" name="TextBox 13"/>
+            <p:cNvSpPr txBox="1"/>
+            <p:nvPr/>
+          </p:nvSpPr>
+          <p:spPr>
+            <a:xfrm>
+              <a:off x="5332190" y="4027482"/>
+              <a:ext cx="1401537" cy="461665"/>
+            </a:xfrm>
+            <a:prstGeom prst="rect">
+              <a:avLst/>
+            </a:prstGeom>
+            <a:noFill/>
+          </p:spPr>
+          <p:txBody>
+            <a:bodyPr wrap="square" rtlCol="0">
+              <a:spAutoFit/>
+            </a:bodyPr>
+            <a:lstStyle/>
+            <a:p>
+              <a:r>
+                <a:rPr lang="en-US" sz="2400" dirty="0" smtClean="0"/>
+                <a:t>upstream</a:t>
+              </a:r>
+            </a:p>
+          </p:txBody>
+        </p:sp>
+        <p:sp>
+          <p:nvSpPr>
+            <p:cNvPr id="12" name="Left Arrow 11"/>
+            <p:cNvSpPr/>
+            <p:nvPr/>
+          </p:nvSpPr>
+          <p:spPr>
+            <a:xfrm rot="16200000">
+              <a:off x="2083196" y="3361012"/>
+              <a:ext cx="1819262" cy="1336927"/>
+            </a:xfrm>
+            <a:prstGeom prst="leftArrow">
+              <a:avLst/>
+            </a:prstGeom>
+          </p:spPr>
+          <p:style>
+            <a:lnRef idx="2">
+              <a:schemeClr val="accent1">
+                <a:shade val="50000"/>
+              </a:schemeClr>
+            </a:lnRef>
+            <a:fillRef idx="1">
+              <a:schemeClr val="accent1"/>
+            </a:fillRef>
+            <a:effectRef idx="0">
+              <a:schemeClr val="accent1"/>
+            </a:effectRef>
+            <a:fontRef idx="minor">
+              <a:schemeClr val="lt1"/>
+            </a:fontRef>
+          </p:style>
+          <p:txBody>
+            <a:bodyPr rtlCol="0" anchor="ctr"/>
+            <a:lstStyle/>
+            <a:p>
+              <a:pPr algn="ctr"/>
+              <a:r>
+                <a:rPr lang="en-US" sz="2800" dirty="0"/>
+                <a:t>clone</a:t>
+              </a:r>
+            </a:p>
+          </p:txBody>
+        </p:sp>
+        <p:sp>
+          <p:nvSpPr>
+            <p:cNvPr id="13" name="Left Arrow 12"/>
+            <p:cNvSpPr/>
+            <p:nvPr/>
+          </p:nvSpPr>
+          <p:spPr>
+            <a:xfrm>
+              <a:off x="3761545" y="1654430"/>
+              <a:ext cx="1819262" cy="1336927"/>
+            </a:xfrm>
+            <a:prstGeom prst="leftArrow">
+              <a:avLst/>
+            </a:prstGeom>
+          </p:spPr>
+          <p:style>
+            <a:lnRef idx="2">
+              <a:schemeClr val="accent1">
+                <a:shade val="50000"/>
+              </a:schemeClr>
+            </a:lnRef>
+            <a:fillRef idx="1">
+              <a:schemeClr val="accent1"/>
+            </a:fillRef>
+            <a:effectRef idx="0">
+              <a:schemeClr val="accent1"/>
+            </a:effectRef>
+            <a:fontRef idx="minor">
+              <a:schemeClr val="lt1"/>
+            </a:fontRef>
+          </p:style>
+          <p:txBody>
+            <a:bodyPr rtlCol="0" anchor="ctr"/>
+            <a:lstStyle/>
+            <a:p>
+              <a:pPr algn="ctr"/>
+              <a:r>
+                <a:rPr lang="en-US" sz="2800" dirty="0"/>
+                <a:t>fork</a:t>
+              </a:r>
+            </a:p>
+          </p:txBody>
+        </p:sp>
+      </p:grpSp>
       <p:sp>
         <p:nvSpPr>
           <p:cNvPr id="3" name="Slide Number Placeholder 2"/>

</xml_diff>